<commit_message>
-fixed null pointer. -updated powerpoint
</commit_message>
<xml_diff>
--- a/deliverables/G2 Bank and ATM System.pptx
+++ b/deliverables/G2 Bank and ATM System.pptx
@@ -15,9 +15,9 @@
     <p:sldId id="275" r:id="rId9"/>
     <p:sldId id="273" r:id="rId10"/>
     <p:sldId id="272" r:id="rId11"/>
-    <p:sldId id="259" r:id="rId12"/>
-    <p:sldId id="258" r:id="rId13"/>
-    <p:sldId id="281" r:id="rId14"/>
+    <p:sldId id="281" r:id="rId12"/>
+    <p:sldId id="259" r:id="rId13"/>
+    <p:sldId id="258" r:id="rId14"/>
     <p:sldId id="264" r:id="rId15"/>
     <p:sldId id="265" r:id="rId16"/>
     <p:sldId id="268" r:id="rId17"/>
@@ -26,8 +26,7 @@
     <p:sldId id="277" r:id="rId20"/>
     <p:sldId id="276" r:id="rId21"/>
     <p:sldId id="267" r:id="rId22"/>
-    <p:sldId id="274" r:id="rId23"/>
-    <p:sldId id="263" r:id="rId24"/>
+    <p:sldId id="263" r:id="rId23"/>
   </p:sldIdLst>
   <p:sldSz cx="9144000" cy="6858000" type="screen4x3"/>
   <p:notesSz cx="6858000" cy="9144000"/>
@@ -316,7 +315,8 @@
           <a:p>
             <a:fld id="{7C0612ED-BC8A-4E0D-92B1-31851677434D}" type="datetimeFigureOut">
               <a:rPr lang="en-US" smtClean="0"/>
-              <a:t>6/5/2013</a:t>
+              <a:pPr/>
+              <a:t>6/6/2013</a:t>
             </a:fld>
             <a:endParaRPr lang="en-US" dirty="0"/>
           </a:p>
@@ -339,6 +339,7 @@
           <a:p>
             <a:fld id="{28510D8B-948E-4C8B-A250-B3111A9538BC}" type="slidenum">
               <a:rPr lang="en-US" smtClean="0"/>
+              <a:pPr/>
               <a:t>‹#›</a:t>
             </a:fld>
             <a:endParaRPr lang="en-US" dirty="0"/>
@@ -481,7 +482,8 @@
           <a:p>
             <a:fld id="{7C0612ED-BC8A-4E0D-92B1-31851677434D}" type="datetimeFigureOut">
               <a:rPr lang="en-US" smtClean="0"/>
-              <a:t>6/5/2013</a:t>
+              <a:pPr/>
+              <a:t>6/6/2013</a:t>
             </a:fld>
             <a:endParaRPr lang="en-US" dirty="0"/>
           </a:p>
@@ -523,6 +525,7 @@
           <a:p>
             <a:fld id="{28510D8B-948E-4C8B-A250-B3111A9538BC}" type="slidenum">
               <a:rPr lang="en-US" smtClean="0"/>
+              <a:pPr/>
               <a:t>‹#›</a:t>
             </a:fld>
             <a:endParaRPr lang="en-US" dirty="0"/>
@@ -656,7 +659,8 @@
           <a:p>
             <a:fld id="{7C0612ED-BC8A-4E0D-92B1-31851677434D}" type="datetimeFigureOut">
               <a:rPr lang="en-US" smtClean="0"/>
-              <a:t>6/5/2013</a:t>
+              <a:pPr/>
+              <a:t>6/6/2013</a:t>
             </a:fld>
             <a:endParaRPr lang="en-US" dirty="0"/>
           </a:p>
@@ -698,6 +702,7 @@
           <a:p>
             <a:fld id="{28510D8B-948E-4C8B-A250-B3111A9538BC}" type="slidenum">
               <a:rPr lang="en-US" smtClean="0"/>
+              <a:pPr/>
               <a:t>‹#›</a:t>
             </a:fld>
             <a:endParaRPr lang="en-US" dirty="0"/>
@@ -821,7 +826,8 @@
           <a:p>
             <a:fld id="{7C0612ED-BC8A-4E0D-92B1-31851677434D}" type="datetimeFigureOut">
               <a:rPr lang="en-US" smtClean="0"/>
-              <a:t>6/5/2013</a:t>
+              <a:pPr/>
+              <a:t>6/6/2013</a:t>
             </a:fld>
             <a:endParaRPr lang="en-US" dirty="0"/>
           </a:p>
@@ -863,6 +869,7 @@
           <a:p>
             <a:fld id="{28510D8B-948E-4C8B-A250-B3111A9538BC}" type="slidenum">
               <a:rPr lang="en-US" smtClean="0"/>
+              <a:pPr/>
               <a:t>‹#›</a:t>
             </a:fld>
             <a:endParaRPr lang="en-US" dirty="0"/>
@@ -1060,7 +1067,8 @@
           <a:p>
             <a:fld id="{7C0612ED-BC8A-4E0D-92B1-31851677434D}" type="datetimeFigureOut">
               <a:rPr lang="en-US" smtClean="0"/>
-              <a:t>6/5/2013</a:t>
+              <a:pPr/>
+              <a:t>6/6/2013</a:t>
             </a:fld>
             <a:endParaRPr lang="en-US" dirty="0"/>
           </a:p>
@@ -1102,6 +1110,7 @@
           <a:p>
             <a:fld id="{28510D8B-948E-4C8B-A250-B3111A9538BC}" type="slidenum">
               <a:rPr lang="en-US" smtClean="0"/>
+              <a:pPr/>
               <a:t>‹#›</a:t>
             </a:fld>
             <a:endParaRPr lang="en-US" dirty="0"/>
@@ -1150,7 +1159,8 @@
           <a:p>
             <a:fld id="{7C0612ED-BC8A-4E0D-92B1-31851677434D}" type="datetimeFigureOut">
               <a:rPr lang="en-US" smtClean="0"/>
-              <a:t>6/5/2013</a:t>
+              <a:pPr/>
+              <a:t>6/6/2013</a:t>
             </a:fld>
             <a:endParaRPr lang="en-US" dirty="0"/>
           </a:p>
@@ -1192,6 +1202,7 @@
           <a:p>
             <a:fld id="{28510D8B-948E-4C8B-A250-B3111A9538BC}" type="slidenum">
               <a:rPr lang="en-US" smtClean="0"/>
+              <a:pPr/>
               <a:t>‹#›</a:t>
             </a:fld>
             <a:endParaRPr lang="en-US" dirty="0"/>
@@ -1524,7 +1535,8 @@
           <a:p>
             <a:fld id="{7C0612ED-BC8A-4E0D-92B1-31851677434D}" type="datetimeFigureOut">
               <a:rPr lang="en-US" smtClean="0"/>
-              <a:t>6/5/2013</a:t>
+              <a:pPr/>
+              <a:t>6/6/2013</a:t>
             </a:fld>
             <a:endParaRPr lang="en-US" dirty="0"/>
           </a:p>
@@ -1566,6 +1578,7 @@
           <a:p>
             <a:fld id="{28510D8B-948E-4C8B-A250-B3111A9538BC}" type="slidenum">
               <a:rPr lang="en-US" smtClean="0"/>
+              <a:pPr/>
               <a:t>‹#›</a:t>
             </a:fld>
             <a:endParaRPr lang="en-US" dirty="0"/>
@@ -1779,7 +1792,8 @@
           <a:p>
             <a:fld id="{7C0612ED-BC8A-4E0D-92B1-31851677434D}" type="datetimeFigureOut">
               <a:rPr lang="en-US" smtClean="0"/>
-              <a:t>6/5/2013</a:t>
+              <a:pPr/>
+              <a:t>6/6/2013</a:t>
             </a:fld>
             <a:endParaRPr lang="en-US" dirty="0"/>
           </a:p>
@@ -1821,6 +1835,7 @@
           <a:p>
             <a:fld id="{28510D8B-948E-4C8B-A250-B3111A9538BC}" type="slidenum">
               <a:rPr lang="en-US" smtClean="0"/>
+              <a:pPr/>
               <a:t>‹#›</a:t>
             </a:fld>
             <a:endParaRPr lang="en-US" dirty="0"/>
@@ -1869,7 +1884,8 @@
           <a:p>
             <a:fld id="{7C0612ED-BC8A-4E0D-92B1-31851677434D}" type="datetimeFigureOut">
               <a:rPr lang="en-US" smtClean="0"/>
-              <a:t>6/5/2013</a:t>
+              <a:pPr/>
+              <a:t>6/6/2013</a:t>
             </a:fld>
             <a:endParaRPr lang="en-US" dirty="0"/>
           </a:p>
@@ -1911,6 +1927,7 @@
           <a:p>
             <a:fld id="{28510D8B-948E-4C8B-A250-B3111A9538BC}" type="slidenum">
               <a:rPr lang="en-US" smtClean="0"/>
+              <a:pPr/>
               <a:t>‹#›</a:t>
             </a:fld>
             <a:endParaRPr lang="en-US" dirty="0"/>
@@ -2143,7 +2160,8 @@
           <a:p>
             <a:fld id="{7C0612ED-BC8A-4E0D-92B1-31851677434D}" type="datetimeFigureOut">
               <a:rPr lang="en-US" smtClean="0"/>
-              <a:t>6/5/2013</a:t>
+              <a:pPr/>
+              <a:t>6/6/2013</a:t>
             </a:fld>
             <a:endParaRPr lang="en-US" dirty="0"/>
           </a:p>
@@ -2185,6 +2203,7 @@
           <a:p>
             <a:fld id="{28510D8B-948E-4C8B-A250-B3111A9538BC}" type="slidenum">
               <a:rPr lang="en-US" smtClean="0"/>
+              <a:pPr/>
               <a:t>‹#›</a:t>
             </a:fld>
             <a:endParaRPr lang="en-US" dirty="0"/>
@@ -2415,7 +2434,8 @@
           <a:p>
             <a:fld id="{7C0612ED-BC8A-4E0D-92B1-31851677434D}" type="datetimeFigureOut">
               <a:rPr lang="en-US" smtClean="0"/>
-              <a:t>6/5/2013</a:t>
+              <a:pPr/>
+              <a:t>6/6/2013</a:t>
             </a:fld>
             <a:endParaRPr lang="en-US" dirty="0"/>
           </a:p>
@@ -2457,6 +2477,7 @@
           <a:p>
             <a:fld id="{28510D8B-948E-4C8B-A250-B3111A9538BC}" type="slidenum">
               <a:rPr lang="en-US" smtClean="0"/>
+              <a:pPr/>
               <a:t>‹#›</a:t>
             </a:fld>
             <a:endParaRPr lang="en-US" dirty="0"/>
@@ -2715,7 +2736,8 @@
           <a:p>
             <a:fld id="{7C0612ED-BC8A-4E0D-92B1-31851677434D}" type="datetimeFigureOut">
               <a:rPr lang="en-US" smtClean="0"/>
-              <a:t>6/5/2013</a:t>
+              <a:pPr/>
+              <a:t>6/6/2013</a:t>
             </a:fld>
             <a:endParaRPr lang="en-US" dirty="0"/>
           </a:p>
@@ -2754,6 +2776,7 @@
           <a:p>
             <a:fld id="{28510D8B-948E-4C8B-A250-B3111A9538BC}" type="slidenum">
               <a:rPr lang="en-US" smtClean="0"/>
+              <a:pPr/>
               <a:t>‹#›</a:t>
             </a:fld>
             <a:endParaRPr lang="en-US" dirty="0"/>
@@ -3258,7 +3281,7 @@
     </p:spTree>
     <p:extLst>
       <p:ext uri="{BB962C8B-B14F-4D97-AF65-F5344CB8AC3E}">
-        <p14:creationId xmlns:p14="http://schemas.microsoft.com/office/powerpoint/2010/main" val="2200677224"/>
+        <p14:creationId xmlns:p14="http://schemas.microsoft.com/office/powerpoint/2010/main" xmlns="" val="2200677224"/>
       </p:ext>
     </p:extLst>
   </p:cSld>
@@ -3351,7 +3374,7 @@
           <a:blip r:embed="rId2" cstate="print">
             <a:extLst>
               <a:ext uri="{28A0092B-C50C-407E-A947-70E740481C1C}">
-                <a14:useLocalDpi xmlns:a14="http://schemas.microsoft.com/office/drawing/2010/main" val="0"/>
+                <a14:useLocalDpi xmlns:a14="http://schemas.microsoft.com/office/drawing/2010/main" xmlns="" val="0"/>
               </a:ext>
             </a:extLst>
           </a:blip>
@@ -3384,7 +3407,7 @@
           <a:blip r:embed="rId3" cstate="print">
             <a:extLst>
               <a:ext uri="{28A0092B-C50C-407E-A947-70E740481C1C}">
-                <a14:useLocalDpi xmlns:a14="http://schemas.microsoft.com/office/drawing/2010/main" val="0"/>
+                <a14:useLocalDpi xmlns:a14="http://schemas.microsoft.com/office/drawing/2010/main" xmlns="" val="0"/>
               </a:ext>
             </a:extLst>
           </a:blip>
@@ -3408,7 +3431,7 @@
     </p:spTree>
     <p:extLst>
       <p:ext uri="{BB962C8B-B14F-4D97-AF65-F5344CB8AC3E}">
-        <p14:creationId xmlns:p14="http://schemas.microsoft.com/office/powerpoint/2010/main" val="2681905227"/>
+        <p14:creationId xmlns:p14="http://schemas.microsoft.com/office/powerpoint/2010/main" xmlns="" val="2681905227"/>
       </p:ext>
     </p:extLst>
   </p:cSld>
@@ -3444,62 +3467,54 @@
       </p:grpSpPr>
       <p:sp>
         <p:nvSpPr>
-          <p:cNvPr id="2" name="Title 1"/>
-          <p:cNvSpPr>
-            <a:spLocks noGrp="1"/>
-          </p:cNvSpPr>
-          <p:nvPr>
-            <p:ph type="title"/>
-          </p:nvPr>
-        </p:nvSpPr>
-        <p:spPr/>
-        <p:txBody>
-          <a:bodyPr/>
-          <a:lstStyle/>
-          <a:p>
-            <a:r>
-              <a:rPr lang="en-US" dirty="0" smtClean="0"/>
-              <a:t>Main Possible Threats</a:t>
-            </a:r>
-            <a:endParaRPr lang="en-US" dirty="0"/>
-          </a:p>
-        </p:txBody>
-      </p:sp>
-      <p:sp>
-        <p:nvSpPr>
-          <p:cNvPr id="3" name="Content Placeholder 2"/>
-          <p:cNvSpPr>
-            <a:spLocks noGrp="1"/>
-          </p:cNvSpPr>
-          <p:nvPr>
-            <p:ph idx="1"/>
-          </p:nvPr>
-        </p:nvSpPr>
-        <p:spPr/>
-        <p:txBody>
-          <a:bodyPr/>
-          <a:lstStyle/>
-          <a:p>
-            <a:r>
-              <a:rPr lang="en-US" dirty="0" smtClean="0"/>
-              <a:t>Brute force</a:t>
-            </a:r>
-          </a:p>
-          <a:p>
-            <a:r>
-              <a:rPr lang="en-US" dirty="0" smtClean="0"/>
-              <a:t>Man-in-the-middle</a:t>
-            </a:r>
-          </a:p>
-          <a:p>
-            <a:endParaRPr lang="en-US" dirty="0" smtClean="0"/>
+          <p:cNvPr id="6" name="Title 5"/>
+          <p:cNvSpPr>
+            <a:spLocks noGrp="1"/>
+          </p:cNvSpPr>
+          <p:nvPr>
+            <p:ph type="ctrTitle"/>
+          </p:nvPr>
+        </p:nvSpPr>
+        <p:spPr/>
+        <p:txBody>
+          <a:bodyPr/>
+          <a:lstStyle/>
+          <a:p>
+            <a:r>
+              <a:rPr lang="en-US" b="1" dirty="0"/>
+              <a:t>Security Protocol </a:t>
+            </a:r>
+            <a:r>
+              <a:rPr lang="en-US" b="1" dirty="0" smtClean="0"/>
+              <a:t>Implementation</a:t>
+            </a:r>
+            <a:endParaRPr lang="en-US" dirty="0"/>
+          </a:p>
+        </p:txBody>
+      </p:sp>
+      <p:sp>
+        <p:nvSpPr>
+          <p:cNvPr id="5" name="Text Placeholder 4"/>
+          <p:cNvSpPr>
+            <a:spLocks noGrp="1"/>
+          </p:cNvSpPr>
+          <p:nvPr>
+            <p:ph type="subTitle" idx="1"/>
+          </p:nvPr>
+        </p:nvSpPr>
+        <p:spPr/>
+        <p:txBody>
+          <a:bodyPr/>
+          <a:lstStyle/>
+          <a:p>
+            <a:endParaRPr lang="en-US" dirty="0"/>
           </a:p>
         </p:txBody>
       </p:sp>
     </p:spTree>
     <p:extLst>
       <p:ext uri="{BB962C8B-B14F-4D97-AF65-F5344CB8AC3E}">
-        <p14:creationId xmlns:p14="http://schemas.microsoft.com/office/powerpoint/2010/main" val="2141663306"/>
+        <p14:creationId xmlns:p14="http://schemas.microsoft.com/office/powerpoint/2010/main" xmlns="" val="1858665310"/>
       </p:ext>
     </p:extLst>
   </p:cSld>
@@ -3550,7 +3565,7 @@
           <a:p>
             <a:r>
               <a:rPr lang="en-US" dirty="0" smtClean="0"/>
-              <a:t>Security Features</a:t>
+              <a:t>Main Possible Threats</a:t>
             </a:r>
             <a:endParaRPr lang="en-US" dirty="0"/>
           </a:p>
@@ -3573,69 +3588,24 @@
           <a:p>
             <a:r>
               <a:rPr lang="en-US" dirty="0" smtClean="0"/>
-              <a:t>Session IDs</a:t>
-            </a:r>
-          </a:p>
-          <a:p>
-            <a:r>
-              <a:rPr lang="en-US" dirty="0" smtClean="0"/>
-              <a:t>Encryption</a:t>
-            </a:r>
-          </a:p>
-          <a:p>
-            <a:pPr lvl="1"/>
-            <a:r>
-              <a:rPr lang="en-US" dirty="0" smtClean="0"/>
-              <a:t>RSA</a:t>
-            </a:r>
-          </a:p>
-          <a:p>
-            <a:pPr lvl="1"/>
-            <a:r>
-              <a:rPr lang="en-US" dirty="0" smtClean="0"/>
-              <a:t>AES</a:t>
-            </a:r>
-          </a:p>
-          <a:p>
-            <a:r>
-              <a:rPr lang="en-US" dirty="0" smtClean="0"/>
-              <a:t>3 Strike Rule</a:t>
-            </a:r>
-          </a:p>
-          <a:p>
-            <a:pPr lvl="1"/>
-            <a:r>
-              <a:rPr lang="en-US" dirty="0" smtClean="0"/>
-              <a:t>Brute force only takes 30 seconds without</a:t>
-            </a:r>
-          </a:p>
-          <a:p>
-            <a:r>
-              <a:rPr lang="en-US" dirty="0" smtClean="0"/>
-              <a:t>Session timeouts</a:t>
-            </a:r>
-          </a:p>
-          <a:p>
-            <a:r>
-              <a:rPr lang="en-US" dirty="0" smtClean="0"/>
-              <a:t>Session lockouts</a:t>
-            </a:r>
-          </a:p>
-          <a:p>
-            <a:r>
-              <a:rPr lang="en-US" dirty="0" smtClean="0"/>
-              <a:t>Signed/Sealed Objects</a:t>
-            </a:r>
-          </a:p>
-          <a:p>
-            <a:endParaRPr lang="en-US" dirty="0"/>
+              <a:t>Brute force</a:t>
+            </a:r>
+          </a:p>
+          <a:p>
+            <a:r>
+              <a:rPr lang="en-US" dirty="0" smtClean="0"/>
+              <a:t>Man-in-the-middle</a:t>
+            </a:r>
+          </a:p>
+          <a:p>
+            <a:endParaRPr lang="en-US" dirty="0" smtClean="0"/>
           </a:p>
         </p:txBody>
       </p:sp>
     </p:spTree>
     <p:extLst>
       <p:ext uri="{BB962C8B-B14F-4D97-AF65-F5344CB8AC3E}">
-        <p14:creationId xmlns:p14="http://schemas.microsoft.com/office/powerpoint/2010/main" val="308081974"/>
+        <p14:creationId xmlns:p14="http://schemas.microsoft.com/office/powerpoint/2010/main" xmlns="" val="2141663306"/>
       </p:ext>
     </p:extLst>
   </p:cSld>
@@ -3671,45 +3641,91 @@
       </p:grpSpPr>
       <p:sp>
         <p:nvSpPr>
-          <p:cNvPr id="6" name="Title 5"/>
-          <p:cNvSpPr>
-            <a:spLocks noGrp="1"/>
-          </p:cNvSpPr>
-          <p:nvPr>
-            <p:ph type="ctrTitle"/>
-          </p:nvPr>
-        </p:nvSpPr>
-        <p:spPr/>
-        <p:txBody>
-          <a:bodyPr/>
-          <a:lstStyle/>
-          <a:p>
-            <a:r>
-              <a:rPr lang="en-US" b="1" dirty="0"/>
-              <a:t>Security Protocol </a:t>
-            </a:r>
-            <a:r>
-              <a:rPr lang="en-US" b="1" dirty="0" smtClean="0"/>
-              <a:t>Implementation</a:t>
-            </a:r>
-            <a:endParaRPr lang="en-US" dirty="0"/>
-          </a:p>
-        </p:txBody>
-      </p:sp>
-      <p:sp>
-        <p:nvSpPr>
-          <p:cNvPr id="5" name="Text Placeholder 4"/>
-          <p:cNvSpPr>
-            <a:spLocks noGrp="1"/>
-          </p:cNvSpPr>
-          <p:nvPr>
-            <p:ph type="subTitle" idx="1"/>
-          </p:nvPr>
-        </p:nvSpPr>
-        <p:spPr/>
-        <p:txBody>
-          <a:bodyPr/>
-          <a:lstStyle/>
+          <p:cNvPr id="2" name="Title 1"/>
+          <p:cNvSpPr>
+            <a:spLocks noGrp="1"/>
+          </p:cNvSpPr>
+          <p:nvPr>
+            <p:ph type="title"/>
+          </p:nvPr>
+        </p:nvSpPr>
+        <p:spPr/>
+        <p:txBody>
+          <a:bodyPr/>
+          <a:lstStyle/>
+          <a:p>
+            <a:r>
+              <a:rPr lang="en-US" dirty="0" smtClean="0"/>
+              <a:t>Security Features</a:t>
+            </a:r>
+            <a:endParaRPr lang="en-US" dirty="0"/>
+          </a:p>
+        </p:txBody>
+      </p:sp>
+      <p:sp>
+        <p:nvSpPr>
+          <p:cNvPr id="3" name="Content Placeholder 2"/>
+          <p:cNvSpPr>
+            <a:spLocks noGrp="1"/>
+          </p:cNvSpPr>
+          <p:nvPr>
+            <p:ph idx="1"/>
+          </p:nvPr>
+        </p:nvSpPr>
+        <p:spPr/>
+        <p:txBody>
+          <a:bodyPr/>
+          <a:lstStyle/>
+          <a:p>
+            <a:r>
+              <a:rPr lang="en-US" dirty="0" smtClean="0"/>
+              <a:t>Session IDs</a:t>
+            </a:r>
+          </a:p>
+          <a:p>
+            <a:r>
+              <a:rPr lang="en-US" dirty="0" smtClean="0"/>
+              <a:t>Encryption</a:t>
+            </a:r>
+          </a:p>
+          <a:p>
+            <a:pPr lvl="1"/>
+            <a:r>
+              <a:rPr lang="en-US" dirty="0" smtClean="0"/>
+              <a:t>RSA</a:t>
+            </a:r>
+          </a:p>
+          <a:p>
+            <a:pPr lvl="1"/>
+            <a:r>
+              <a:rPr lang="en-US" dirty="0" smtClean="0"/>
+              <a:t>AES</a:t>
+            </a:r>
+          </a:p>
+          <a:p>
+            <a:r>
+              <a:rPr lang="en-US" dirty="0" smtClean="0"/>
+              <a:t>3 Strike Rule</a:t>
+            </a:r>
+          </a:p>
+          <a:p>
+            <a:r>
+              <a:rPr lang="en-US" dirty="0" smtClean="0"/>
+              <a:t>Session timeouts</a:t>
+            </a:r>
+          </a:p>
+          <a:p>
+            <a:r>
+              <a:rPr lang="en-US" dirty="0" smtClean="0"/>
+              <a:t>Session lockouts</a:t>
+            </a:r>
+          </a:p>
+          <a:p>
+            <a:r>
+              <a:rPr lang="en-US" dirty="0" smtClean="0"/>
+              <a:t>Signed/Sealed Objects</a:t>
+            </a:r>
+          </a:p>
           <a:p>
             <a:endParaRPr lang="en-US" dirty="0"/>
           </a:p>
@@ -3718,7 +3734,7 @@
     </p:spTree>
     <p:extLst>
       <p:ext uri="{BB962C8B-B14F-4D97-AF65-F5344CB8AC3E}">
-        <p14:creationId xmlns:p14="http://schemas.microsoft.com/office/powerpoint/2010/main" val="1858665310"/>
+        <p14:creationId xmlns:p14="http://schemas.microsoft.com/office/powerpoint/2010/main" xmlns="" val="308081974"/>
       </p:ext>
     </p:extLst>
   </p:cSld>
@@ -3816,7 +3832,7 @@
     </p:spTree>
     <p:extLst>
       <p:ext uri="{BB962C8B-B14F-4D97-AF65-F5344CB8AC3E}">
-        <p14:creationId xmlns:p14="http://schemas.microsoft.com/office/powerpoint/2010/main" val="2619388605"/>
+        <p14:creationId xmlns:p14="http://schemas.microsoft.com/office/powerpoint/2010/main" xmlns="" val="2619388605"/>
       </p:ext>
     </p:extLst>
   </p:cSld>
@@ -3894,7 +3910,7 @@
           <a:blip r:embed="rId2">
             <a:extLst>
               <a:ext uri="{28A0092B-C50C-407E-A947-70E740481C1C}">
-                <a14:useLocalDpi xmlns:a14="http://schemas.microsoft.com/office/drawing/2010/main" val="0"/>
+                <a14:useLocalDpi xmlns:a14="http://schemas.microsoft.com/office/drawing/2010/main" xmlns="" val="0"/>
               </a:ext>
             </a:extLst>
           </a:blip>
@@ -3903,15 +3919,178 @@
         </p:blipFill>
         <p:spPr>
           <a:xfrm>
-            <a:off x="1828799" y="2817628"/>
+            <a:off x="1828800" y="3276600"/>
             <a:ext cx="5454503" cy="3413051"/>
           </a:xfrm>
         </p:spPr>
       </p:pic>
+      <p:sp>
+        <p:nvSpPr>
+          <p:cNvPr id="5" name="Content Placeholder 2"/>
+          <p:cNvSpPr txBox="1">
+            <a:spLocks/>
+          </p:cNvSpPr>
+          <p:nvPr/>
+        </p:nvSpPr>
+        <p:spPr>
+          <a:xfrm>
+            <a:off x="914400" y="2769833"/>
+            <a:ext cx="7315200" cy="3539527"/>
+          </a:xfrm>
+          <a:prstGeom prst="rect">
+            <a:avLst/>
+          </a:prstGeom>
+        </p:spPr>
+        <p:txBody>
+          <a:bodyPr vert="horz" lIns="91440" tIns="45720" rIns="91440" bIns="45720" rtlCol="0">
+            <a:normAutofit/>
+          </a:bodyPr>
+          <a:lstStyle/>
+          <a:p>
+            <a:pPr marL="228600" marR="0" lvl="0" indent="-182880" algn="l" defTabSz="914400" rtl="0" eaLnBrk="1" fontAlgn="auto" latinLnBrk="0" hangingPunct="1">
+              <a:lnSpc>
+                <a:spcPct val="100000"/>
+              </a:lnSpc>
+              <a:spcBef>
+                <a:spcPct val="20000"/>
+              </a:spcBef>
+              <a:spcAft>
+                <a:spcPts val="0"/>
+              </a:spcAft>
+              <a:buClr>
+                <a:schemeClr val="tx2"/>
+              </a:buClr>
+              <a:buSzTx/>
+              <a:buFont typeface="Wingdings" charset="2"/>
+              <a:buChar char="§"/>
+              <a:tabLst/>
+              <a:defRPr/>
+            </a:pPr>
+            <a:r>
+              <a:rPr kumimoji="0" lang="en-US" sz="2000" b="0" i="0" u="none" strike="noStrike" kern="1200" cap="none" spc="0" normalizeH="0" baseline="0" noProof="0" dirty="0" smtClean="0">
+                <a:ln>
+                  <a:noFill/>
+                </a:ln>
+                <a:solidFill>
+                  <a:schemeClr val="tx1"/>
+                </a:solidFill>
+                <a:effectLst/>
+                <a:uLnTx/>
+                <a:uFillTx/>
+                <a:latin typeface="+mn-lt"/>
+                <a:ea typeface="+mn-ea"/>
+                <a:cs typeface="+mn-cs"/>
+              </a:rPr>
+              <a:t>Certificate stored in Java </a:t>
+            </a:r>
+            <a:r>
+              <a:rPr kumimoji="0" lang="en-US" sz="2000" b="0" i="0" u="none" strike="noStrike" kern="1200" cap="none" spc="0" normalizeH="0" baseline="0" noProof="0" dirty="0" err="1" smtClean="0">
+                <a:ln>
+                  <a:noFill/>
+                </a:ln>
+                <a:solidFill>
+                  <a:schemeClr val="tx1"/>
+                </a:solidFill>
+                <a:effectLst/>
+                <a:uLnTx/>
+                <a:uFillTx/>
+                <a:latin typeface="+mn-lt"/>
+                <a:ea typeface="+mn-ea"/>
+                <a:cs typeface="+mn-cs"/>
+              </a:rPr>
+              <a:t>SignedObject</a:t>
+            </a:r>
+            <a:endParaRPr kumimoji="0" lang="en-US" sz="2000" b="0" i="0" u="none" strike="noStrike" kern="1200" cap="none" spc="0" normalizeH="0" baseline="0" noProof="0" dirty="0" smtClean="0">
+              <a:ln>
+                <a:noFill/>
+              </a:ln>
+              <a:solidFill>
+                <a:schemeClr val="tx1"/>
+              </a:solidFill>
+              <a:effectLst/>
+              <a:uLnTx/>
+              <a:uFillTx/>
+              <a:latin typeface="+mn-lt"/>
+              <a:ea typeface="+mn-ea"/>
+              <a:cs typeface="+mn-cs"/>
+            </a:endParaRPr>
+          </a:p>
+          <a:p>
+            <a:pPr marL="228600" marR="0" lvl="0" indent="-182880" algn="l" defTabSz="914400" rtl="0" eaLnBrk="1" fontAlgn="auto" latinLnBrk="0" hangingPunct="1">
+              <a:lnSpc>
+                <a:spcPct val="100000"/>
+              </a:lnSpc>
+              <a:spcBef>
+                <a:spcPct val="20000"/>
+              </a:spcBef>
+              <a:spcAft>
+                <a:spcPts val="0"/>
+              </a:spcAft>
+              <a:buClr>
+                <a:schemeClr val="tx2"/>
+              </a:buClr>
+              <a:buSzTx/>
+              <a:buFont typeface="Wingdings" charset="2"/>
+              <a:buChar char="§"/>
+              <a:tabLst/>
+              <a:defRPr/>
+            </a:pPr>
+            <a:endParaRPr kumimoji="0" lang="en-US" sz="2000" b="0" i="0" u="none" strike="noStrike" kern="1200" cap="none" spc="0" normalizeH="0" baseline="0" noProof="0" dirty="0" smtClean="0">
+              <a:ln>
+                <a:noFill/>
+              </a:ln>
+              <a:solidFill>
+                <a:schemeClr val="tx1"/>
+              </a:solidFill>
+              <a:effectLst/>
+              <a:uLnTx/>
+              <a:uFillTx/>
+              <a:latin typeface="+mn-lt"/>
+              <a:ea typeface="+mn-ea"/>
+              <a:cs typeface="+mn-cs"/>
+            </a:endParaRPr>
+          </a:p>
+          <a:p>
+            <a:pPr marL="228600" marR="0" lvl="0" indent="-182880" algn="l" defTabSz="914400" rtl="0" eaLnBrk="1" fontAlgn="auto" latinLnBrk="0" hangingPunct="1">
+              <a:lnSpc>
+                <a:spcPct val="100000"/>
+              </a:lnSpc>
+              <a:spcBef>
+                <a:spcPct val="20000"/>
+              </a:spcBef>
+              <a:spcAft>
+                <a:spcPts val="0"/>
+              </a:spcAft>
+              <a:buClr>
+                <a:schemeClr val="tx2"/>
+              </a:buClr>
+              <a:buSzTx/>
+              <a:buFont typeface="Wingdings" charset="2"/>
+              <a:buChar char="§"/>
+              <a:tabLst/>
+              <a:defRPr/>
+            </a:pPr>
+            <a:endParaRPr kumimoji="0" lang="en-US" sz="2000" b="0" i="0" u="none" strike="noStrike" kern="1200" cap="none" spc="0" normalizeH="0" baseline="0" noProof="0" dirty="0">
+              <a:ln>
+                <a:noFill/>
+              </a:ln>
+              <a:solidFill>
+                <a:schemeClr val="tx1"/>
+              </a:solidFill>
+              <a:effectLst/>
+              <a:uLnTx/>
+              <a:uFillTx/>
+              <a:latin typeface="+mn-lt"/>
+              <a:ea typeface="+mn-ea"/>
+              <a:cs typeface="+mn-cs"/>
+            </a:endParaRPr>
+          </a:p>
+        </p:txBody>
+      </p:sp>
     </p:spTree>
     <p:extLst>
       <p:ext uri="{BB962C8B-B14F-4D97-AF65-F5344CB8AC3E}">
-        <p14:creationId xmlns:p14="http://schemas.microsoft.com/office/powerpoint/2010/main" val="730609100"/>
+        <p14:creationId xmlns:p14="http://schemas.microsoft.com/office/powerpoint/2010/main" xmlns="" val="730609100"/>
       </p:ext>
     </p:extLst>
   </p:cSld>
@@ -4052,7 +4231,7 @@
     </p:spTree>
     <p:extLst>
       <p:ext uri="{BB962C8B-B14F-4D97-AF65-F5344CB8AC3E}">
-        <p14:creationId xmlns:p14="http://schemas.microsoft.com/office/powerpoint/2010/main" val="1446934530"/>
+        <p14:creationId xmlns:p14="http://schemas.microsoft.com/office/powerpoint/2010/main" xmlns="" val="1446934530"/>
       </p:ext>
     </p:extLst>
   </p:cSld>
@@ -4123,7 +4302,7 @@
           <a:blip r:embed="rId2">
             <a:extLst>
               <a:ext uri="{28A0092B-C50C-407E-A947-70E740481C1C}">
-                <a14:useLocalDpi xmlns:a14="http://schemas.microsoft.com/office/drawing/2010/main" val="0"/>
+                <a14:useLocalDpi xmlns:a14="http://schemas.microsoft.com/office/drawing/2010/main" xmlns="" val="0"/>
               </a:ext>
             </a:extLst>
           </a:blip>
@@ -4140,7 +4319,7 @@
     </p:spTree>
     <p:extLst>
       <p:ext uri="{BB962C8B-B14F-4D97-AF65-F5344CB8AC3E}">
-        <p14:creationId xmlns:p14="http://schemas.microsoft.com/office/powerpoint/2010/main" val="1776958563"/>
+        <p14:creationId xmlns:p14="http://schemas.microsoft.com/office/powerpoint/2010/main" xmlns="" val="1776958563"/>
       </p:ext>
     </p:extLst>
   </p:cSld>
@@ -4339,7 +4518,7 @@
     </p:spTree>
     <p:extLst>
       <p:ext uri="{BB962C8B-B14F-4D97-AF65-F5344CB8AC3E}">
-        <p14:creationId xmlns:p14="http://schemas.microsoft.com/office/powerpoint/2010/main" val="659195988"/>
+        <p14:creationId xmlns:p14="http://schemas.microsoft.com/office/powerpoint/2010/main" xmlns="" val="659195988"/>
       </p:ext>
     </p:extLst>
   </p:cSld>
@@ -4419,11 +4598,11 @@
           <a:p>
             <a:r>
               <a:rPr lang="en-US" dirty="0" smtClean="0"/>
-              <a:t>unique </a:t>
+              <a:t>Unique session ID </a:t>
             </a:r>
             <a:r>
               <a:rPr lang="en-US" dirty="0"/>
-              <a:t>Session Id for </a:t>
+              <a:t>for </a:t>
             </a:r>
             <a:r>
               <a:rPr lang="en-US" dirty="0" smtClean="0"/>
@@ -4457,7 +4636,7 @@
     </p:spTree>
     <p:extLst>
       <p:ext uri="{BB962C8B-B14F-4D97-AF65-F5344CB8AC3E}">
-        <p14:creationId xmlns:p14="http://schemas.microsoft.com/office/powerpoint/2010/main" val="1634813529"/>
+        <p14:creationId xmlns:p14="http://schemas.microsoft.com/office/powerpoint/2010/main" xmlns="" val="1634813529"/>
       </p:ext>
     </p:extLst>
   </p:cSld>
@@ -4545,7 +4724,7 @@
     </p:spTree>
     <p:extLst>
       <p:ext uri="{BB962C8B-B14F-4D97-AF65-F5344CB8AC3E}">
-        <p14:creationId xmlns:p14="http://schemas.microsoft.com/office/powerpoint/2010/main" val="3938730615"/>
+        <p14:creationId xmlns:p14="http://schemas.microsoft.com/office/powerpoint/2010/main" xmlns="" val="3938730615"/>
       </p:ext>
     </p:extLst>
   </p:cSld>
@@ -4623,6 +4802,13 @@
             </a:r>
           </a:p>
           <a:p>
+            <a:pPr lvl="1"/>
+            <a:r>
+              <a:rPr lang="en-US" dirty="0" smtClean="0"/>
+              <a:t>128 bit vs. 256 bit</a:t>
+            </a:r>
+          </a:p>
+          <a:p>
             <a:r>
               <a:rPr lang="en-US" dirty="0" smtClean="0"/>
               <a:t>Sensitive pin info protect by RSA</a:t>
@@ -4651,19 +4837,25 @@
             </a:r>
           </a:p>
           <a:p>
+            <a:pPr lvl="2"/>
+            <a:r>
+              <a:rPr lang="en-US" dirty="0" smtClean="0"/>
+              <a:t>Brute force only takes 30 seconds without</a:t>
+            </a:r>
+          </a:p>
+          <a:p>
             <a:pPr lvl="1"/>
             <a:r>
               <a:rPr lang="en-US" dirty="0" smtClean="0"/>
               <a:t>Session timeout</a:t>
             </a:r>
-            <a:endParaRPr lang="en-US" dirty="0"/>
           </a:p>
         </p:txBody>
       </p:sp>
     </p:spTree>
     <p:extLst>
       <p:ext uri="{BB962C8B-B14F-4D97-AF65-F5344CB8AC3E}">
-        <p14:creationId xmlns:p14="http://schemas.microsoft.com/office/powerpoint/2010/main" val="2532964045"/>
+        <p14:creationId xmlns:p14="http://schemas.microsoft.com/office/powerpoint/2010/main" xmlns="" val="2532964045"/>
       </p:ext>
     </p:extLst>
   </p:cSld>
@@ -4763,7 +4955,7 @@
     </p:spTree>
     <p:extLst>
       <p:ext uri="{BB962C8B-B14F-4D97-AF65-F5344CB8AC3E}">
-        <p14:creationId xmlns:p14="http://schemas.microsoft.com/office/powerpoint/2010/main" val="3115008912"/>
+        <p14:creationId xmlns:p14="http://schemas.microsoft.com/office/powerpoint/2010/main" xmlns="" val="3115008912"/>
       </p:ext>
     </p:extLst>
   </p:cSld>
@@ -4814,7 +5006,7 @@
           <a:p>
             <a:r>
               <a:rPr lang="en-US" dirty="0" smtClean="0"/>
-              <a:t>References</a:t>
+              <a:t>Questions? </a:t>
             </a:r>
             <a:endParaRPr lang="en-US" dirty="0"/>
           </a:p>
@@ -4835,47 +5027,6 @@
           <a:bodyPr/>
           <a:lstStyle/>
           <a:p>
-            <a:pPr marL="502920" indent="-457200">
-              <a:buFont typeface="+mj-lt"/>
-              <a:buAutoNum type="arabicPeriod"/>
-            </a:pPr>
-            <a:r>
-              <a:rPr lang="en-US" dirty="0" smtClean="0"/>
-              <a:t>http</a:t>
-            </a:r>
-            <a:r>
-              <a:rPr lang="en-US" dirty="0"/>
-              <a:t>://</a:t>
-            </a:r>
-            <a:r>
-              <a:rPr lang="en-US" dirty="0" smtClean="0"/>
-              <a:t>www.theinquirer.net/inquirer/news/2102435/aes-encryption-cracked</a:t>
-            </a:r>
-          </a:p>
-          <a:p>
-            <a:pPr marL="502920" indent="-457200">
-              <a:buFont typeface="+mj-lt"/>
-              <a:buAutoNum type="arabicPeriod"/>
-            </a:pPr>
-            <a:r>
-              <a:rPr lang="en-US" dirty="0" smtClean="0"/>
-              <a:t>https</a:t>
-            </a:r>
-            <a:r>
-              <a:rPr lang="en-US" dirty="0"/>
-              <a:t>://</a:t>
-            </a:r>
-            <a:r>
-              <a:rPr lang="en-US" dirty="0" smtClean="0"/>
-              <a:t>en.wikipedia.org/wiki/Block_cipher_mode_of_operation</a:t>
-            </a:r>
-            <a:r>
-              <a:rPr lang="en-US" dirty="0"/>
-              <a:t/>
-            </a:r>
-            <a:br>
-              <a:rPr lang="en-US" dirty="0"/>
-            </a:br>
             <a:endParaRPr lang="en-US" dirty="0"/>
           </a:p>
         </p:txBody>
@@ -4883,86 +5034,7 @@
     </p:spTree>
     <p:extLst>
       <p:ext uri="{BB962C8B-B14F-4D97-AF65-F5344CB8AC3E}">
-        <p14:creationId xmlns:p14="http://schemas.microsoft.com/office/powerpoint/2010/main" val="2218597717"/>
-      </p:ext>
-    </p:extLst>
-  </p:cSld>
-  <p:clrMapOvr>
-    <a:masterClrMapping/>
-  </p:clrMapOvr>
-  <p:timing>
-    <p:tnLst>
-      <p:par>
-        <p:cTn id="1" dur="indefinite" restart="never" nodeType="tmRoot"/>
-      </p:par>
-    </p:tnLst>
-  </p:timing>
-</p:sld>
-</file>
-
-<file path=ppt/slides/slide23.xml><?xml version="1.0" encoding="utf-8"?>
-<p:sld xmlns:a="http://schemas.openxmlformats.org/drawingml/2006/main" xmlns:r="http://schemas.openxmlformats.org/officeDocument/2006/relationships" xmlns:p="http://schemas.openxmlformats.org/presentationml/2006/main">
-  <p:cSld>
-    <p:spTree>
-      <p:nvGrpSpPr>
-        <p:cNvPr id="1" name=""/>
-        <p:cNvGrpSpPr/>
-        <p:nvPr/>
-      </p:nvGrpSpPr>
-      <p:grpSpPr>
-        <a:xfrm>
-          <a:off x="0" y="0"/>
-          <a:ext cx="0" cy="0"/>
-          <a:chOff x="0" y="0"/>
-          <a:chExt cx="0" cy="0"/>
-        </a:xfrm>
-      </p:grpSpPr>
-      <p:sp>
-        <p:nvSpPr>
-          <p:cNvPr id="2" name="Title 1"/>
-          <p:cNvSpPr>
-            <a:spLocks noGrp="1"/>
-          </p:cNvSpPr>
-          <p:nvPr>
-            <p:ph type="title"/>
-          </p:nvPr>
-        </p:nvSpPr>
-        <p:spPr/>
-        <p:txBody>
-          <a:bodyPr/>
-          <a:lstStyle/>
-          <a:p>
-            <a:r>
-              <a:rPr lang="en-US" dirty="0" smtClean="0"/>
-              <a:t>Questions? </a:t>
-            </a:r>
-            <a:endParaRPr lang="en-US" dirty="0"/>
-          </a:p>
-        </p:txBody>
-      </p:sp>
-      <p:sp>
-        <p:nvSpPr>
-          <p:cNvPr id="3" name="Content Placeholder 2"/>
-          <p:cNvSpPr>
-            <a:spLocks noGrp="1"/>
-          </p:cNvSpPr>
-          <p:nvPr>
-            <p:ph idx="1"/>
-          </p:nvPr>
-        </p:nvSpPr>
-        <p:spPr/>
-        <p:txBody>
-          <a:bodyPr/>
-          <a:lstStyle/>
-          <a:p>
-            <a:endParaRPr lang="en-US" dirty="0"/>
-          </a:p>
-        </p:txBody>
-      </p:sp>
-    </p:spTree>
-    <p:extLst>
-      <p:ext uri="{BB962C8B-B14F-4D97-AF65-F5344CB8AC3E}">
-        <p14:creationId xmlns:p14="http://schemas.microsoft.com/office/powerpoint/2010/main" val="1176174759"/>
+        <p14:creationId xmlns:p14="http://schemas.microsoft.com/office/powerpoint/2010/main" xmlns="" val="1176174759"/>
       </p:ext>
     </p:extLst>
   </p:cSld>
@@ -5123,7 +5195,7 @@
     </p:spTree>
     <p:extLst>
       <p:ext uri="{BB962C8B-B14F-4D97-AF65-F5344CB8AC3E}">
-        <p14:creationId xmlns:p14="http://schemas.microsoft.com/office/powerpoint/2010/main" val="936722277"/>
+        <p14:creationId xmlns:p14="http://schemas.microsoft.com/office/powerpoint/2010/main" xmlns="" val="936722277"/>
       </p:ext>
     </p:extLst>
   </p:cSld>
@@ -5306,7 +5378,7 @@
     </p:spTree>
     <p:extLst>
       <p:ext uri="{BB962C8B-B14F-4D97-AF65-F5344CB8AC3E}">
-        <p14:creationId xmlns:p14="http://schemas.microsoft.com/office/powerpoint/2010/main" val="2672684985"/>
+        <p14:creationId xmlns:p14="http://schemas.microsoft.com/office/powerpoint/2010/main" xmlns="" val="2672684985"/>
       </p:ext>
     </p:extLst>
   </p:cSld>
@@ -5458,7 +5530,7 @@
     </p:spTree>
     <p:extLst>
       <p:ext uri="{BB962C8B-B14F-4D97-AF65-F5344CB8AC3E}">
-        <p14:creationId xmlns:p14="http://schemas.microsoft.com/office/powerpoint/2010/main" val="3129768291"/>
+        <p14:creationId xmlns:p14="http://schemas.microsoft.com/office/powerpoint/2010/main" xmlns="" val="3129768291"/>
       </p:ext>
     </p:extLst>
   </p:cSld>
@@ -5572,7 +5644,7 @@
     </p:spTree>
     <p:extLst>
       <p:ext uri="{BB962C8B-B14F-4D97-AF65-F5344CB8AC3E}">
-        <p14:creationId xmlns:p14="http://schemas.microsoft.com/office/powerpoint/2010/main" val="2700314581"/>
+        <p14:creationId xmlns:p14="http://schemas.microsoft.com/office/powerpoint/2010/main" xmlns="" val="2700314581"/>
       </p:ext>
     </p:extLst>
   </p:cSld>
@@ -5624,13 +5696,17 @@
         </p:spPr>
         <p:txBody>
           <a:bodyPr>
-            <a:normAutofit fontScale="90000"/>
+            <a:normAutofit/>
           </a:bodyPr>
           <a:lstStyle/>
           <a:p>
             <a:r>
+              <a:rPr lang="en-US" dirty="0" smtClean="0"/>
+              <a:t>Encryption </a:t>
+            </a:r>
+            <a:r>
               <a:rPr lang="en-US" dirty="0"/>
-              <a:t>Session Encryption Algorithm Selection</a:t>
+              <a:t>Algorithm Selection</a:t>
             </a:r>
           </a:p>
         </p:txBody>
@@ -5762,7 +5838,7 @@
     </p:spTree>
     <p:extLst>
       <p:ext uri="{BB962C8B-B14F-4D97-AF65-F5344CB8AC3E}">
-        <p14:creationId xmlns:p14="http://schemas.microsoft.com/office/powerpoint/2010/main" val="2841416182"/>
+        <p14:creationId xmlns:p14="http://schemas.microsoft.com/office/powerpoint/2010/main" xmlns="" val="2841416182"/>
       </p:ext>
     </p:extLst>
   </p:cSld>
@@ -5964,7 +6040,7 @@
     </p:spTree>
     <p:extLst>
       <p:ext uri="{BB962C8B-B14F-4D97-AF65-F5344CB8AC3E}">
-        <p14:creationId xmlns:p14="http://schemas.microsoft.com/office/powerpoint/2010/main" val="2824913078"/>
+        <p14:creationId xmlns:p14="http://schemas.microsoft.com/office/powerpoint/2010/main" xmlns="" val="2824913078"/>
       </p:ext>
     </p:extLst>
   </p:cSld>
@@ -6012,7 +6088,7 @@
           <a:blip r:embed="rId2">
             <a:extLst>
               <a:ext uri="{28A0092B-C50C-407E-A947-70E740481C1C}">
-                <a14:useLocalDpi xmlns:a14="http://schemas.microsoft.com/office/drawing/2010/main" val="0"/>
+                <a14:useLocalDpi xmlns:a14="http://schemas.microsoft.com/office/drawing/2010/main" xmlns="" val="0"/>
               </a:ext>
             </a:extLst>
           </a:blip>
@@ -6062,7 +6138,7 @@
           <a:blip r:embed="rId3">
             <a:extLst>
               <a:ext uri="{28A0092B-C50C-407E-A947-70E740481C1C}">
-                <a14:useLocalDpi xmlns:a14="http://schemas.microsoft.com/office/drawing/2010/main" val="0"/>
+                <a14:useLocalDpi xmlns:a14="http://schemas.microsoft.com/office/drawing/2010/main" xmlns="" val="0"/>
               </a:ext>
             </a:extLst>
           </a:blip>
@@ -6092,7 +6168,7 @@
           <a:blip r:embed="rId4">
             <a:extLst>
               <a:ext uri="{28A0092B-C50C-407E-A947-70E740481C1C}">
-                <a14:useLocalDpi xmlns:a14="http://schemas.microsoft.com/office/drawing/2010/main" val="0"/>
+                <a14:useLocalDpi xmlns:a14="http://schemas.microsoft.com/office/drawing/2010/main" xmlns="" val="0"/>
               </a:ext>
             </a:extLst>
           </a:blip>
@@ -6147,7 +6223,7 @@
     </p:spTree>
     <p:extLst>
       <p:ext uri="{BB962C8B-B14F-4D97-AF65-F5344CB8AC3E}">
-        <p14:creationId xmlns:p14="http://schemas.microsoft.com/office/powerpoint/2010/main" val="2986127464"/>
+        <p14:creationId xmlns:p14="http://schemas.microsoft.com/office/powerpoint/2010/main" xmlns="" val="2986127464"/>
       </p:ext>
     </p:extLst>
   </p:cSld>

</xml_diff>